<commit_message>
created the re-adjudication powerpoint
</commit_message>
<xml_diff>
--- a/PowerPoints/Phase 3 - Claims Terminology/011 Deductibles CoPays and Coinsurance.pptx
+++ b/PowerPoints/Phase 3 - Claims Terminology/011 Deductibles CoPays and Coinsurance.pptx
@@ -255,7 +255,7 @@
           <a:p>
             <a:fld id="{FF632088-7E42-4B13-8645-6CA4616862AF}" type="datetimeFigureOut">
               <a:rPr lang="en-US" smtClean="0"/>
-              <a:t>3/2/2016</a:t>
+              <a:t>3/3/2016</a:t>
             </a:fld>
             <a:endParaRPr lang="en-US"/>
           </a:p>
@@ -425,7 +425,7 @@
           <a:p>
             <a:fld id="{FF632088-7E42-4B13-8645-6CA4616862AF}" type="datetimeFigureOut">
               <a:rPr lang="en-US" smtClean="0"/>
-              <a:t>3/2/2016</a:t>
+              <a:t>3/3/2016</a:t>
             </a:fld>
             <a:endParaRPr lang="en-US"/>
           </a:p>
@@ -605,7 +605,7 @@
           <a:p>
             <a:fld id="{FF632088-7E42-4B13-8645-6CA4616862AF}" type="datetimeFigureOut">
               <a:rPr lang="en-US" smtClean="0"/>
-              <a:t>3/2/2016</a:t>
+              <a:t>3/3/2016</a:t>
             </a:fld>
             <a:endParaRPr lang="en-US"/>
           </a:p>
@@ -805,7 +805,7 @@
           <a:p>
             <a:fld id="{FF632088-7E42-4B13-8645-6CA4616862AF}" type="datetimeFigureOut">
               <a:rPr lang="en-US" smtClean="0"/>
-              <a:t>3/2/2016</a:t>
+              <a:t>3/3/2016</a:t>
             </a:fld>
             <a:endParaRPr lang="en-US"/>
           </a:p>
@@ -1022,7 +1022,7 @@
           <a:p>
             <a:fld id="{FF632088-7E42-4B13-8645-6CA4616862AF}" type="datetimeFigureOut">
               <a:rPr lang="en-US" smtClean="0"/>
-              <a:t>3/2/2016</a:t>
+              <a:t>3/3/2016</a:t>
             </a:fld>
             <a:endParaRPr lang="en-US"/>
           </a:p>
@@ -1307,7 +1307,7 @@
           <a:p>
             <a:fld id="{FF632088-7E42-4B13-8645-6CA4616862AF}" type="datetimeFigureOut">
               <a:rPr lang="en-US" smtClean="0"/>
-              <a:t>3/2/2016</a:t>
+              <a:t>3/3/2016</a:t>
             </a:fld>
             <a:endParaRPr lang="en-US"/>
           </a:p>
@@ -1581,7 +1581,7 @@
           <a:p>
             <a:fld id="{FF632088-7E42-4B13-8645-6CA4616862AF}" type="datetimeFigureOut">
               <a:rPr lang="en-US" smtClean="0"/>
-              <a:t>3/2/2016</a:t>
+              <a:t>3/3/2016</a:t>
             </a:fld>
             <a:endParaRPr lang="en-US"/>
           </a:p>
@@ -1678,7 +1678,7 @@
   </p:clrMapOvr>
   <p:extLst>
     <p:ext uri="{DCECCB84-F9BA-43D5-87BE-67443E8EF086}">
-      <p15:sldGuideLst xmlns="" xmlns:p15="http://schemas.microsoft.com/office/powerpoint/2012/main"/>
+      <p15:sldGuideLst xmlns:p15="http://schemas.microsoft.com/office/powerpoint/2012/main" xmlns=""/>
     </p:ext>
   </p:extLst>
 </p:sldLayout>
@@ -2008,7 +2008,7 @@
           <a:p>
             <a:fld id="{FF632088-7E42-4B13-8645-6CA4616862AF}" type="datetimeFigureOut">
               <a:rPr lang="en-US" smtClean="0"/>
-              <a:t>3/2/2016</a:t>
+              <a:t>3/3/2016</a:t>
             </a:fld>
             <a:endParaRPr lang="en-US"/>
           </a:p>
@@ -2105,7 +2105,7 @@
   </p:clrMapOvr>
   <p:extLst>
     <p:ext uri="{DCECCB84-F9BA-43D5-87BE-67443E8EF086}">
-      <p15:sldGuideLst xmlns="" xmlns:p15="http://schemas.microsoft.com/office/powerpoint/2012/main"/>
+      <p15:sldGuideLst xmlns:p15="http://schemas.microsoft.com/office/powerpoint/2012/main" xmlns=""/>
     </p:ext>
   </p:extLst>
 </p:sldLayout>
@@ -2168,7 +2168,7 @@
           <a:p>
             <a:fld id="{FF632088-7E42-4B13-8645-6CA4616862AF}" type="datetimeFigureOut">
               <a:rPr lang="en-US" smtClean="0"/>
-              <a:t>3/2/2016</a:t>
+              <a:t>3/3/2016</a:t>
             </a:fld>
             <a:endParaRPr lang="en-US"/>
           </a:p>
@@ -2300,7 +2300,7 @@
           <a:p>
             <a:fld id="{FF632088-7E42-4B13-8645-6CA4616862AF}" type="datetimeFigureOut">
               <a:rPr lang="en-US" smtClean="0"/>
-              <a:t>3/2/2016</a:t>
+              <a:t>3/3/2016</a:t>
             </a:fld>
             <a:endParaRPr lang="en-US"/>
           </a:p>
@@ -2551,7 +2551,7 @@
           <a:p>
             <a:fld id="{FF632088-7E42-4B13-8645-6CA4616862AF}" type="datetimeFigureOut">
               <a:rPr lang="en-US" smtClean="0"/>
-              <a:t>3/2/2016</a:t>
+              <a:t>3/3/2016</a:t>
             </a:fld>
             <a:endParaRPr lang="en-US"/>
           </a:p>
@@ -2648,7 +2648,7 @@
   </p:clrMapOvr>
   <p:extLst>
     <p:ext uri="{DCECCB84-F9BA-43D5-87BE-67443E8EF086}">
-      <p15:sldGuideLst xmlns="" xmlns:p15="http://schemas.microsoft.com/office/powerpoint/2012/main"/>
+      <p15:sldGuideLst xmlns:p15="http://schemas.microsoft.com/office/powerpoint/2012/main" xmlns=""/>
     </p:ext>
   </p:extLst>
 </p:sldLayout>
@@ -2763,7 +2763,7 @@
           <a:p>
             <a:fld id="{FF632088-7E42-4B13-8645-6CA4616862AF}" type="datetimeFigureOut">
               <a:rPr lang="en-US" smtClean="0"/>
-              <a:t>3/2/2016</a:t>
+              <a:t>3/3/2016</a:t>
             </a:fld>
             <a:endParaRPr lang="en-US"/>
           </a:p>
@@ -3181,7 +3181,7 @@
           <a:p>
             <a:fld id="{FF632088-7E42-4B13-8645-6CA4616862AF}" type="datetimeFigureOut">
               <a:rPr lang="en-US" smtClean="0"/>
-              <a:t>3/2/2016</a:t>
+              <a:t>3/3/2016</a:t>
             </a:fld>
             <a:endParaRPr lang="en-US"/>
           </a:p>
@@ -3393,7 +3393,7 @@
           <a:p>
             <a:fld id="{FF632088-7E42-4B13-8645-6CA4616862AF}" type="datetimeFigureOut">
               <a:rPr lang="en-US" smtClean="0"/>
-              <a:t>3/2/2016</a:t>
+              <a:t>3/3/2016</a:t>
             </a:fld>
             <a:endParaRPr lang="en-US"/>
           </a:p>
@@ -3614,7 +3614,7 @@
           <a:p>
             <a:fld id="{FF632088-7E42-4B13-8645-6CA4616862AF}" type="datetimeFigureOut">
               <a:rPr lang="en-US" smtClean="0"/>
-              <a:t>3/2/2016</a:t>
+              <a:t>3/3/2016</a:t>
             </a:fld>
             <a:endParaRPr lang="en-US"/>
           </a:p>
@@ -3902,7 +3902,7 @@
           <a:p>
             <a:fld id="{FF632088-7E42-4B13-8645-6CA4616862AF}" type="datetimeFigureOut">
               <a:rPr lang="en-US" smtClean="0"/>
-              <a:t>3/2/2016</a:t>
+              <a:t>3/3/2016</a:t>
             </a:fld>
             <a:endParaRPr lang="en-US"/>
           </a:p>
@@ -4134,7 +4134,7 @@
           <a:p>
             <a:fld id="{FF632088-7E42-4B13-8645-6CA4616862AF}" type="datetimeFigureOut">
               <a:rPr lang="en-US" smtClean="0"/>
-              <a:t>3/2/2016</a:t>
+              <a:t>3/3/2016</a:t>
             </a:fld>
             <a:endParaRPr lang="en-US"/>
           </a:p>
@@ -4194,7 +4194,7 @@
   </p:clrMapOvr>
   <p:extLst>
     <p:ext uri="{DCECCB84-F9BA-43D5-87BE-67443E8EF086}">
-      <p15:sldGuideLst xmlns="" xmlns:p15="http://schemas.microsoft.com/office/powerpoint/2012/main"/>
+      <p15:sldGuideLst xmlns:p15="http://schemas.microsoft.com/office/powerpoint/2012/main" xmlns=""/>
     </p:ext>
   </p:extLst>
 </p:sldLayout>
@@ -4486,7 +4486,7 @@
           <a:p>
             <a:fld id="{FF632088-7E42-4B13-8645-6CA4616862AF}" type="datetimeFigureOut">
               <a:rPr lang="en-US" smtClean="0"/>
-              <a:t>3/2/2016</a:t>
+              <a:t>3/3/2016</a:t>
             </a:fld>
             <a:endParaRPr lang="en-US"/>
           </a:p>
@@ -4569,7 +4569,7 @@
   </p:clrMapOvr>
   <p:extLst>
     <p:ext uri="{DCECCB84-F9BA-43D5-87BE-67443E8EF086}">
-      <p15:sldGuideLst xmlns="" xmlns:p15="http://schemas.microsoft.com/office/powerpoint/2012/main"/>
+      <p15:sldGuideLst xmlns:p15="http://schemas.microsoft.com/office/powerpoint/2012/main" xmlns=""/>
     </p:ext>
   </p:extLst>
 </p:sldLayout>
@@ -4609,7 +4609,7 @@
           <a:p>
             <a:fld id="{FF632088-7E42-4B13-8645-6CA4616862AF}" type="datetimeFigureOut">
               <a:rPr lang="en-US" smtClean="0"/>
-              <a:t>3/2/2016</a:t>
+              <a:t>3/3/2016</a:t>
             </a:fld>
             <a:endParaRPr lang="en-US"/>
           </a:p>
@@ -4727,7 +4727,7 @@
           <a:p>
             <a:fld id="{FF632088-7E42-4B13-8645-6CA4616862AF}" type="datetimeFigureOut">
               <a:rPr lang="en-US" smtClean="0"/>
-              <a:t>3/2/2016</a:t>
+              <a:t>3/3/2016</a:t>
             </a:fld>
             <a:endParaRPr lang="en-US"/>
           </a:p>
@@ -5011,7 +5011,7 @@
           <a:p>
             <a:fld id="{FF632088-7E42-4B13-8645-6CA4616862AF}" type="datetimeFigureOut">
               <a:rPr lang="en-US" smtClean="0"/>
-              <a:t>3/2/2016</a:t>
+              <a:t>3/3/2016</a:t>
             </a:fld>
             <a:endParaRPr lang="en-US"/>
           </a:p>
@@ -5071,7 +5071,7 @@
   </p:clrMapOvr>
   <p:extLst>
     <p:ext uri="{DCECCB84-F9BA-43D5-87BE-67443E8EF086}">
-      <p15:sldGuideLst xmlns="" xmlns:p15="http://schemas.microsoft.com/office/powerpoint/2012/main"/>
+      <p15:sldGuideLst xmlns:p15="http://schemas.microsoft.com/office/powerpoint/2012/main" xmlns=""/>
     </p:ext>
   </p:extLst>
 </p:sldLayout>
@@ -5280,7 +5280,7 @@
           <a:p>
             <a:fld id="{FF632088-7E42-4B13-8645-6CA4616862AF}" type="datetimeFigureOut">
               <a:rPr lang="en-US" smtClean="0"/>
-              <a:t>3/2/2016</a:t>
+              <a:t>3/3/2016</a:t>
             </a:fld>
             <a:endParaRPr lang="en-US"/>
           </a:p>
@@ -5494,7 +5494,7 @@
           <a:p>
             <a:fld id="{FF632088-7E42-4B13-8645-6CA4616862AF}" type="datetimeFigureOut">
               <a:rPr lang="en-US" smtClean="0"/>
-              <a:t>3/2/2016</a:t>
+              <a:t>3/3/2016</a:t>
             </a:fld>
             <a:endParaRPr lang="en-US"/>
           </a:p>
@@ -5870,7 +5870,7 @@
   </p:txStyles>
   <p:extLst>
     <p:ext uri="{27BBF7A9-308A-43DC-89C8-2F10F3537804}">
-      <p15:sldGuideLst xmlns="" xmlns:p15="http://schemas.microsoft.com/office/powerpoint/2012/main"/>
+      <p15:sldGuideLst xmlns:p15="http://schemas.microsoft.com/office/powerpoint/2012/main" xmlns=""/>
     </p:ext>
   </p:extLst>
 </p:sldMaster>
@@ -6099,7 +6099,7 @@
           <a:p>
             <a:fld id="{FF632088-7E42-4B13-8645-6CA4616862AF}" type="datetimeFigureOut">
               <a:rPr lang="en-US" smtClean="0"/>
-              <a:t>3/2/2016</a:t>
+              <a:t>3/3/2016</a:t>
             </a:fld>
             <a:endParaRPr lang="en-US"/>
           </a:p>
@@ -6567,7 +6567,7 @@
   </p:txStyles>
   <p:extLst>
     <p:ext uri="{27BBF7A9-308A-43DC-89C8-2F10F3537804}">
-      <p15:sldGuideLst xmlns="" xmlns:p15="http://schemas.microsoft.com/office/powerpoint/2012/main"/>
+      <p15:sldGuideLst xmlns:p15="http://schemas.microsoft.com/office/powerpoint/2012/main" xmlns=""/>
     </p:ext>
   </p:extLst>
 </p:sldMaster>
@@ -6697,7 +6697,11 @@
           <a:bodyPr/>
           <a:lstStyle/>
           <a:p>
-            <a:endParaRPr lang="en-US"/>
+            <a:r>
+              <a:rPr lang="en-US" dirty="0" smtClean="0"/>
+              <a:t>Copays</a:t>
+            </a:r>
+            <a:endParaRPr lang="en-US" dirty="0"/>
           </a:p>
         </p:txBody>
       </p:sp>
@@ -6765,7 +6769,11 @@
           <a:bodyPr/>
           <a:lstStyle/>
           <a:p>
-            <a:endParaRPr lang="en-US"/>
+            <a:r>
+              <a:rPr lang="en-US" dirty="0" smtClean="0"/>
+              <a:t>Deductibles</a:t>
+            </a:r>
+            <a:endParaRPr lang="en-US" dirty="0"/>
           </a:p>
         </p:txBody>
       </p:sp>
@@ -6833,7 +6841,11 @@
           <a:bodyPr/>
           <a:lstStyle/>
           <a:p>
-            <a:endParaRPr lang="en-US"/>
+            <a:r>
+              <a:rPr lang="en-US" dirty="0" smtClean="0"/>
+              <a:t>Coinsurance</a:t>
+            </a:r>
+            <a:endParaRPr lang="en-US" dirty="0"/>
           </a:p>
         </p:txBody>
       </p:sp>
@@ -6901,6 +6913,10 @@
           <a:bodyPr/>
           <a:lstStyle/>
           <a:p>
+            <a:r>
+              <a:rPr lang="en-US" smtClean="0"/>
+              <a:t>Out-of-Pocket Maximums</a:t>
+            </a:r>
             <a:endParaRPr lang="en-US"/>
           </a:p>
         </p:txBody>
@@ -7509,7 +7525,7 @@
   <a:extraClrSchemeLst/>
   <a:extLst>
     <a:ext uri="{05A4C25C-085E-4340-85A3-A5531E510DB2}">
-      <thm15:themeFamily xmlns="" xmlns:thm15="http://schemas.microsoft.com/office/thememl/2012/main" name="Gallery" id="{BBFCD31E-59A1-489D-B089-A3EAD7CAE12E}" vid="{AC464412-510E-4F2B-8947-A0DDBD028997}"/>
+      <thm15:themeFamily xmlns:thm15="http://schemas.microsoft.com/office/thememl/2012/main" xmlns="" name="Gallery" id="{BBFCD31E-59A1-489D-B089-A3EAD7CAE12E}" vid="{AC464412-510E-4F2B-8947-A0DDBD028997}"/>
     </a:ext>
   </a:extLst>
 </a:theme>

</xml_diff>